<commit_message>
Changed the plot imagesstatus
</commit_message>
<xml_diff>
--- a/final_slides.pptx
+++ b/final_slides.pptx
@@ -114,6 +114,11 @@
       </a:defRPr>
     </a:lvl9pPr>
   </p:defaultTextStyle>
+  <p:extLst>
+    <p:ext uri="{EFAFB233-063F-42B5-8137-9DF3F51BA10A}">
+      <p15:sldGuideLst xmlns:p15="http://schemas.microsoft.com/office/powerpoint/2012/main"/>
+    </p:ext>
+  </p:extLst>
 </p:presentation>
 </file>
 
@@ -266,7 +271,7 @@
           <a:p>
             <a:fld id="{ECE1CBCB-8827-45B6-A7EE-ECBF9693F8D8}" type="datetimeFigureOut">
               <a:rPr lang="en-PH" smtClean="0"/>
-              <a:t>3 Dec 2024</a:t>
+              <a:t>04/12/2024</a:t>
             </a:fld>
             <a:endParaRPr lang="en-PH"/>
           </a:p>
@@ -466,7 +471,7 @@
           <a:p>
             <a:fld id="{ECE1CBCB-8827-45B6-A7EE-ECBF9693F8D8}" type="datetimeFigureOut">
               <a:rPr lang="en-PH" smtClean="0"/>
-              <a:t>3 Dec 2024</a:t>
+              <a:t>04/12/2024</a:t>
             </a:fld>
             <a:endParaRPr lang="en-PH"/>
           </a:p>
@@ -676,7 +681,7 @@
           <a:p>
             <a:fld id="{ECE1CBCB-8827-45B6-A7EE-ECBF9693F8D8}" type="datetimeFigureOut">
               <a:rPr lang="en-PH" smtClean="0"/>
-              <a:t>3 Dec 2024</a:t>
+              <a:t>04/12/2024</a:t>
             </a:fld>
             <a:endParaRPr lang="en-PH"/>
           </a:p>
@@ -876,7 +881,7 @@
           <a:p>
             <a:fld id="{ECE1CBCB-8827-45B6-A7EE-ECBF9693F8D8}" type="datetimeFigureOut">
               <a:rPr lang="en-PH" smtClean="0"/>
-              <a:t>3 Dec 2024</a:t>
+              <a:t>04/12/2024</a:t>
             </a:fld>
             <a:endParaRPr lang="en-PH"/>
           </a:p>
@@ -1152,7 +1157,7 @@
           <a:p>
             <a:fld id="{ECE1CBCB-8827-45B6-A7EE-ECBF9693F8D8}" type="datetimeFigureOut">
               <a:rPr lang="en-PH" smtClean="0"/>
-              <a:t>3 Dec 2024</a:t>
+              <a:t>04/12/2024</a:t>
             </a:fld>
             <a:endParaRPr lang="en-PH"/>
           </a:p>
@@ -1420,7 +1425,7 @@
           <a:p>
             <a:fld id="{ECE1CBCB-8827-45B6-A7EE-ECBF9693F8D8}" type="datetimeFigureOut">
               <a:rPr lang="en-PH" smtClean="0"/>
-              <a:t>3 Dec 2024</a:t>
+              <a:t>04/12/2024</a:t>
             </a:fld>
             <a:endParaRPr lang="en-PH"/>
           </a:p>
@@ -1835,7 +1840,7 @@
           <a:p>
             <a:fld id="{ECE1CBCB-8827-45B6-A7EE-ECBF9693F8D8}" type="datetimeFigureOut">
               <a:rPr lang="en-PH" smtClean="0"/>
-              <a:t>3 Dec 2024</a:t>
+              <a:t>04/12/2024</a:t>
             </a:fld>
             <a:endParaRPr lang="en-PH"/>
           </a:p>
@@ -1977,7 +1982,7 @@
           <a:p>
             <a:fld id="{ECE1CBCB-8827-45B6-A7EE-ECBF9693F8D8}" type="datetimeFigureOut">
               <a:rPr lang="en-PH" smtClean="0"/>
-              <a:t>3 Dec 2024</a:t>
+              <a:t>04/12/2024</a:t>
             </a:fld>
             <a:endParaRPr lang="en-PH"/>
           </a:p>
@@ -2090,7 +2095,7 @@
           <a:p>
             <a:fld id="{ECE1CBCB-8827-45B6-A7EE-ECBF9693F8D8}" type="datetimeFigureOut">
               <a:rPr lang="en-PH" smtClean="0"/>
-              <a:t>3 Dec 2024</a:t>
+              <a:t>04/12/2024</a:t>
             </a:fld>
             <a:endParaRPr lang="en-PH"/>
           </a:p>
@@ -2403,7 +2408,7 @@
           <a:p>
             <a:fld id="{ECE1CBCB-8827-45B6-A7EE-ECBF9693F8D8}" type="datetimeFigureOut">
               <a:rPr lang="en-PH" smtClean="0"/>
-              <a:t>3 Dec 2024</a:t>
+              <a:t>04/12/2024</a:t>
             </a:fld>
             <a:endParaRPr lang="en-PH"/>
           </a:p>
@@ -2692,7 +2697,7 @@
           <a:p>
             <a:fld id="{ECE1CBCB-8827-45B6-A7EE-ECBF9693F8D8}" type="datetimeFigureOut">
               <a:rPr lang="en-PH" smtClean="0"/>
-              <a:t>3 Dec 2024</a:t>
+              <a:t>04/12/2024</a:t>
             </a:fld>
             <a:endParaRPr lang="en-PH"/>
           </a:p>
@@ -2935,7 +2940,7 @@
           <a:p>
             <a:fld id="{ECE1CBCB-8827-45B6-A7EE-ECBF9693F8D8}" type="datetimeFigureOut">
               <a:rPr lang="en-PH" smtClean="0"/>
-              <a:t>3 Dec 2024</a:t>
+              <a:t>04/12/2024</a:t>
             </a:fld>
             <a:endParaRPr lang="en-PH"/>
           </a:p>
@@ -3587,7 +3592,7 @@
       </p:sp>
       <p:pic>
         <p:nvPicPr>
-          <p:cNvPr id="8" name="Content Placeholder 7" descr="A graph with a red line and blue dots&#10;&#10;Description automatically generated">
+          <p:cNvPr id="8" name="Content Placeholder 7">
             <a:extLst>
               <a:ext uri="{FF2B5EF4-FFF2-40B4-BE49-F238E27FC236}">
                 <a16:creationId xmlns:a16="http://schemas.microsoft.com/office/drawing/2014/main" id="{23844B93-2E74-F831-8F57-6317794F598D}"/>
@@ -3609,14 +3614,13 @@
               </a:ext>
             </a:extLst>
           </a:blip>
-          <a:stretch>
-            <a:fillRect/>
-          </a:stretch>
+          <a:srcRect/>
+          <a:stretch/>
         </p:blipFill>
         <p:spPr>
           <a:xfrm>
             <a:off x="5871991" y="987425"/>
-            <a:ext cx="4794593" cy="4873625"/>
+            <a:ext cx="5480221" cy="4873625"/>
           </a:xfrm>
         </p:spPr>
       </p:pic>
@@ -4481,7 +4485,7 @@
       </p:sp>
       <p:pic>
         <p:nvPicPr>
-          <p:cNvPr id="9" name="Content Placeholder 8" descr="A graph of different colored bars&#10;&#10;Description automatically generated">
+          <p:cNvPr id="9" name="Content Placeholder 8">
             <a:extLst>
               <a:ext uri="{FF2B5EF4-FFF2-40B4-BE49-F238E27FC236}">
                 <a16:creationId xmlns:a16="http://schemas.microsoft.com/office/drawing/2014/main" id="{CD2E1384-34CD-A84A-D8B0-C9B0AE69B632}"/>
@@ -4503,9 +4507,8 @@
               </a:ext>
             </a:extLst>
           </a:blip>
-          <a:stretch>
-            <a:fillRect/>
-          </a:stretch>
+          <a:srcRect/>
+          <a:stretch/>
         </p:blipFill>
         <p:spPr>
           <a:xfrm>
@@ -4745,7 +4748,7 @@
       </p:sp>
       <p:pic>
         <p:nvPicPr>
-          <p:cNvPr id="6" name="Content Placeholder 5" descr="A graph of different colored lines&#10;&#10;Description automatically generated">
+          <p:cNvPr id="6" name="Content Placeholder 5">
             <a:extLst>
               <a:ext uri="{FF2B5EF4-FFF2-40B4-BE49-F238E27FC236}">
                 <a16:creationId xmlns:a16="http://schemas.microsoft.com/office/drawing/2014/main" id="{53661385-8844-248E-CF15-D66CC30EC961}"/>
@@ -4767,9 +4770,8 @@
               </a:ext>
             </a:extLst>
           </a:blip>
-          <a:stretch>
-            <a:fillRect/>
-          </a:stretch>
+          <a:srcRect/>
+          <a:stretch/>
         </p:blipFill>
         <p:spPr>
           <a:xfrm>

</xml_diff>

<commit_message>
Changed the plot images
</commit_message>
<xml_diff>
--- a/final_slides.pptx
+++ b/final_slides.pptx
@@ -3979,6 +3979,49 @@
           </a:xfrm>
         </p:spPr>
       </p:pic>
+      <p:sp>
+        <p:nvSpPr>
+          <p:cNvPr id="4" name="TextBox 3">
+            <a:extLst>
+              <a:ext uri="{FF2B5EF4-FFF2-40B4-BE49-F238E27FC236}">
+                <a16:creationId xmlns:a16="http://schemas.microsoft.com/office/drawing/2014/main" id="{BE4B5DE9-C95D-716E-6263-6F8AD0908154}"/>
+              </a:ext>
+            </a:extLst>
+          </p:cNvPr>
+          <p:cNvSpPr txBox="1"/>
+          <p:nvPr/>
+        </p:nvSpPr>
+        <p:spPr>
+          <a:xfrm>
+            <a:off x="7905750" y="6531146"/>
+            <a:ext cx="4286250" cy="290913"/>
+          </a:xfrm>
+          <a:prstGeom prst="rect">
+            <a:avLst/>
+          </a:prstGeom>
+          <a:noFill/>
+        </p:spPr>
+        <p:txBody>
+          <a:bodyPr wrap="square">
+            <a:spAutoFit/>
+          </a:bodyPr>
+          <a:lstStyle/>
+          <a:p>
+            <a:pPr>
+              <a:lnSpc>
+                <a:spcPts val="1425"/>
+              </a:lnSpc>
+            </a:pPr>
+            <a:r>
+              <a:rPr lang="en-US" altLang="ja-JP" b="0" dirty="0">
+                <a:effectLst/>
+                <a:latin typeface="+mj-lt"/>
+              </a:rPr>
+              <a:t>image from https://epi.yale.edu/about-epi</a:t>
+            </a:r>
+          </a:p>
+        </p:txBody>
+      </p:sp>
     </p:spTree>
     <p:extLst>
       <p:ext uri="{BB962C8B-B14F-4D97-AF65-F5344CB8AC3E}">

</xml_diff>